<commit_message>
Addition of statistical analysis
Addition of T-test analysis and elimination of unuseful datasets. Little modification to the extraction data code.
</commit_message>
<xml_diff>
--- a/Graphics and Results Storage/Project Presentation.pptx
+++ b/Graphics and Results Storage/Project Presentation.pptx
@@ -8,6 +8,8 @@
     <p:sldId id="256" r:id="rId2"/>
     <p:sldId id="257" r:id="rId3"/>
     <p:sldId id="258" r:id="rId4"/>
+    <p:sldId id="259" r:id="rId5"/>
+    <p:sldId id="260" r:id="rId6"/>
   </p:sldIdLst>
   <p:sldSz cx="12192000" cy="6858000"/>
   <p:notesSz cx="6858000" cy="9144000"/>
@@ -118,8 +120,8 @@
 <pc:chgInfo xmlns:a="http://schemas.openxmlformats.org/drawingml/2006/main" xmlns:r="http://schemas.openxmlformats.org/officeDocument/2006/relationships" xmlns:ac="http://schemas.microsoft.com/office/drawing/2013/main/command" xmlns:pc="http://schemas.microsoft.com/office/powerpoint/2013/main/command">
   <pc:docChgLst>
     <pc:chgData name="Cardenas Prieto, Milton Dario Dario" userId="d1f6a38b-0ea0-40b6-a961-f3733327afe0" providerId="ADAL" clId="{1A7B67DF-69D1-42A5-A59C-3763B4E95150}"/>
-    <pc:docChg chg="custSel addSld modSld">
-      <pc:chgData name="Cardenas Prieto, Milton Dario Dario" userId="d1f6a38b-0ea0-40b6-a961-f3733327afe0" providerId="ADAL" clId="{1A7B67DF-69D1-42A5-A59C-3763B4E95150}" dt="2023-10-30T03:58:15.246" v="6" actId="1076"/>
+    <pc:docChg chg="undo custSel addSld modSld">
+      <pc:chgData name="Cardenas Prieto, Milton Dario Dario" userId="d1f6a38b-0ea0-40b6-a961-f3733327afe0" providerId="ADAL" clId="{1A7B67DF-69D1-42A5-A59C-3763B4E95150}" dt="2023-10-30T05:21:15.684" v="42" actId="1076"/>
       <pc:docMkLst>
         <pc:docMk/>
       </pc:docMkLst>
@@ -162,6 +164,100 @@
           </ac:picMkLst>
         </pc:picChg>
       </pc:sldChg>
+      <pc:sldChg chg="addSp delSp modSp new mod">
+        <pc:chgData name="Cardenas Prieto, Milton Dario Dario" userId="d1f6a38b-0ea0-40b6-a961-f3733327afe0" providerId="ADAL" clId="{1A7B67DF-69D1-42A5-A59C-3763B4E95150}" dt="2023-10-30T04:26:01.861" v="38" actId="1076"/>
+        <pc:sldMkLst>
+          <pc:docMk/>
+          <pc:sldMk cId="4066925894" sldId="259"/>
+        </pc:sldMkLst>
+        <pc:spChg chg="del">
+          <ac:chgData name="Cardenas Prieto, Milton Dario Dario" userId="d1f6a38b-0ea0-40b6-a961-f3733327afe0" providerId="ADAL" clId="{1A7B67DF-69D1-42A5-A59C-3763B4E95150}" dt="2023-10-30T04:15:04.945" v="8" actId="478"/>
+          <ac:spMkLst>
+            <pc:docMk/>
+            <pc:sldMk cId="4066925894" sldId="259"/>
+            <ac:spMk id="2" creationId="{BAFE2D6A-45F5-6B71-C31B-1AD5B5458CB1}"/>
+          </ac:spMkLst>
+        </pc:spChg>
+        <pc:spChg chg="del">
+          <ac:chgData name="Cardenas Prieto, Milton Dario Dario" userId="d1f6a38b-0ea0-40b6-a961-f3733327afe0" providerId="ADAL" clId="{1A7B67DF-69D1-42A5-A59C-3763B4E95150}" dt="2023-10-30T04:15:04.945" v="8" actId="478"/>
+          <ac:spMkLst>
+            <pc:docMk/>
+            <pc:sldMk cId="4066925894" sldId="259"/>
+            <ac:spMk id="3" creationId="{F64FFAB5-B762-8F14-27A0-156EF83BBE85}"/>
+          </ac:spMkLst>
+        </pc:spChg>
+        <pc:picChg chg="add mod">
+          <ac:chgData name="Cardenas Prieto, Milton Dario Dario" userId="d1f6a38b-0ea0-40b6-a961-f3733327afe0" providerId="ADAL" clId="{1A7B67DF-69D1-42A5-A59C-3763B4E95150}" dt="2023-10-30T04:17:32.562" v="32" actId="1076"/>
+          <ac:picMkLst>
+            <pc:docMk/>
+            <pc:sldMk cId="4066925894" sldId="259"/>
+            <ac:picMk id="5" creationId="{75E7A4CE-0DB1-EDD3-B9F0-0475FF9095A1}"/>
+          </ac:picMkLst>
+        </pc:picChg>
+        <pc:picChg chg="add del mod">
+          <ac:chgData name="Cardenas Prieto, Milton Dario Dario" userId="d1f6a38b-0ea0-40b6-a961-f3733327afe0" providerId="ADAL" clId="{1A7B67DF-69D1-42A5-A59C-3763B4E95150}" dt="2023-10-30T04:16:57.991" v="24" actId="478"/>
+          <ac:picMkLst>
+            <pc:docMk/>
+            <pc:sldMk cId="4066925894" sldId="259"/>
+            <ac:picMk id="7" creationId="{9B6A21CE-8EAF-6B4E-7223-0E6A573C3FFB}"/>
+          </ac:picMkLst>
+        </pc:picChg>
+        <pc:picChg chg="add mod">
+          <ac:chgData name="Cardenas Prieto, Milton Dario Dario" userId="d1f6a38b-0ea0-40b6-a961-f3733327afe0" providerId="ADAL" clId="{1A7B67DF-69D1-42A5-A59C-3763B4E95150}" dt="2023-10-30T04:17:43.301" v="34" actId="1076"/>
+          <ac:picMkLst>
+            <pc:docMk/>
+            <pc:sldMk cId="4066925894" sldId="259"/>
+            <ac:picMk id="9" creationId="{99F11AF4-B8F4-CB50-3ACF-A7E9EC044365}"/>
+          </ac:picMkLst>
+        </pc:picChg>
+        <pc:picChg chg="add mod modCrop">
+          <ac:chgData name="Cardenas Prieto, Milton Dario Dario" userId="d1f6a38b-0ea0-40b6-a961-f3733327afe0" providerId="ADAL" clId="{1A7B67DF-69D1-42A5-A59C-3763B4E95150}" dt="2023-10-30T04:17:43.301" v="34" actId="1076"/>
+          <ac:picMkLst>
+            <pc:docMk/>
+            <pc:sldMk cId="4066925894" sldId="259"/>
+            <ac:picMk id="11" creationId="{248E8095-D905-2C7B-C55A-7B2384F15C12}"/>
+          </ac:picMkLst>
+        </pc:picChg>
+        <pc:picChg chg="add mod">
+          <ac:chgData name="Cardenas Prieto, Milton Dario Dario" userId="d1f6a38b-0ea0-40b6-a961-f3733327afe0" providerId="ADAL" clId="{1A7B67DF-69D1-42A5-A59C-3763B4E95150}" dt="2023-10-30T04:26:01.861" v="38" actId="1076"/>
+          <ac:picMkLst>
+            <pc:docMk/>
+            <pc:sldMk cId="4066925894" sldId="259"/>
+            <ac:picMk id="13" creationId="{C137E9FB-6F58-D18C-D5A9-680485F15459}"/>
+          </ac:picMkLst>
+        </pc:picChg>
+      </pc:sldChg>
+      <pc:sldChg chg="addSp delSp modSp new mod">
+        <pc:chgData name="Cardenas Prieto, Milton Dario Dario" userId="d1f6a38b-0ea0-40b6-a961-f3733327afe0" providerId="ADAL" clId="{1A7B67DF-69D1-42A5-A59C-3763B4E95150}" dt="2023-10-30T05:21:15.684" v="42" actId="1076"/>
+        <pc:sldMkLst>
+          <pc:docMk/>
+          <pc:sldMk cId="1368449490" sldId="260"/>
+        </pc:sldMkLst>
+        <pc:spChg chg="del">
+          <ac:chgData name="Cardenas Prieto, Milton Dario Dario" userId="d1f6a38b-0ea0-40b6-a961-f3733327afe0" providerId="ADAL" clId="{1A7B67DF-69D1-42A5-A59C-3763B4E95150}" dt="2023-10-30T05:21:13.231" v="40" actId="478"/>
+          <ac:spMkLst>
+            <pc:docMk/>
+            <pc:sldMk cId="1368449490" sldId="260"/>
+            <ac:spMk id="2" creationId="{E7BD2782-09BB-23B8-384B-BC837ABB04E7}"/>
+          </ac:spMkLst>
+        </pc:spChg>
+        <pc:spChg chg="del">
+          <ac:chgData name="Cardenas Prieto, Milton Dario Dario" userId="d1f6a38b-0ea0-40b6-a961-f3733327afe0" providerId="ADAL" clId="{1A7B67DF-69D1-42A5-A59C-3763B4E95150}" dt="2023-10-30T05:21:13.231" v="40" actId="478"/>
+          <ac:spMkLst>
+            <pc:docMk/>
+            <pc:sldMk cId="1368449490" sldId="260"/>
+            <ac:spMk id="3" creationId="{15DA15BC-2063-9EED-6003-0E0CAA1C506A}"/>
+          </ac:spMkLst>
+        </pc:spChg>
+        <pc:picChg chg="add mod">
+          <ac:chgData name="Cardenas Prieto, Milton Dario Dario" userId="d1f6a38b-0ea0-40b6-a961-f3733327afe0" providerId="ADAL" clId="{1A7B67DF-69D1-42A5-A59C-3763B4E95150}" dt="2023-10-30T05:21:15.684" v="42" actId="1076"/>
+          <ac:picMkLst>
+            <pc:docMk/>
+            <pc:sldMk cId="1368449490" sldId="260"/>
+            <ac:picMk id="5" creationId="{554E9CF6-D405-E9B3-5148-D711ADEED6CA}"/>
+          </ac:picMkLst>
+        </pc:picChg>
+      </pc:sldChg>
     </pc:docChg>
   </pc:docChgLst>
 </pc:chgInfo>
@@ -316,7 +412,7 @@
           <a:p>
             <a:fld id="{AF6FA4DE-2D87-4554-B259-F3E07A713AE2}" type="datetimeFigureOut">
               <a:rPr lang="LID4096" smtClean="0"/>
-              <a:t>10/29/2023</a:t>
+              <a:t>10/30/2023</a:t>
             </a:fld>
             <a:endParaRPr lang="LID4096"/>
           </a:p>
@@ -516,7 +612,7 @@
           <a:p>
             <a:fld id="{AF6FA4DE-2D87-4554-B259-F3E07A713AE2}" type="datetimeFigureOut">
               <a:rPr lang="LID4096" smtClean="0"/>
-              <a:t>10/29/2023</a:t>
+              <a:t>10/30/2023</a:t>
             </a:fld>
             <a:endParaRPr lang="LID4096"/>
           </a:p>
@@ -726,7 +822,7 @@
           <a:p>
             <a:fld id="{AF6FA4DE-2D87-4554-B259-F3E07A713AE2}" type="datetimeFigureOut">
               <a:rPr lang="LID4096" smtClean="0"/>
-              <a:t>10/29/2023</a:t>
+              <a:t>10/30/2023</a:t>
             </a:fld>
             <a:endParaRPr lang="LID4096"/>
           </a:p>
@@ -926,7 +1022,7 @@
           <a:p>
             <a:fld id="{AF6FA4DE-2D87-4554-B259-F3E07A713AE2}" type="datetimeFigureOut">
               <a:rPr lang="LID4096" smtClean="0"/>
-              <a:t>10/29/2023</a:t>
+              <a:t>10/30/2023</a:t>
             </a:fld>
             <a:endParaRPr lang="LID4096"/>
           </a:p>
@@ -1202,7 +1298,7 @@
           <a:p>
             <a:fld id="{AF6FA4DE-2D87-4554-B259-F3E07A713AE2}" type="datetimeFigureOut">
               <a:rPr lang="LID4096" smtClean="0"/>
-              <a:t>10/29/2023</a:t>
+              <a:t>10/30/2023</a:t>
             </a:fld>
             <a:endParaRPr lang="LID4096"/>
           </a:p>
@@ -1470,7 +1566,7 @@
           <a:p>
             <a:fld id="{AF6FA4DE-2D87-4554-B259-F3E07A713AE2}" type="datetimeFigureOut">
               <a:rPr lang="LID4096" smtClean="0"/>
-              <a:t>10/29/2023</a:t>
+              <a:t>10/30/2023</a:t>
             </a:fld>
             <a:endParaRPr lang="LID4096"/>
           </a:p>
@@ -1885,7 +1981,7 @@
           <a:p>
             <a:fld id="{AF6FA4DE-2D87-4554-B259-F3E07A713AE2}" type="datetimeFigureOut">
               <a:rPr lang="LID4096" smtClean="0"/>
-              <a:t>10/29/2023</a:t>
+              <a:t>10/30/2023</a:t>
             </a:fld>
             <a:endParaRPr lang="LID4096"/>
           </a:p>
@@ -2027,7 +2123,7 @@
           <a:p>
             <a:fld id="{AF6FA4DE-2D87-4554-B259-F3E07A713AE2}" type="datetimeFigureOut">
               <a:rPr lang="LID4096" smtClean="0"/>
-              <a:t>10/29/2023</a:t>
+              <a:t>10/30/2023</a:t>
             </a:fld>
             <a:endParaRPr lang="LID4096"/>
           </a:p>
@@ -2140,7 +2236,7 @@
           <a:p>
             <a:fld id="{AF6FA4DE-2D87-4554-B259-F3E07A713AE2}" type="datetimeFigureOut">
               <a:rPr lang="LID4096" smtClean="0"/>
-              <a:t>10/29/2023</a:t>
+              <a:t>10/30/2023</a:t>
             </a:fld>
             <a:endParaRPr lang="LID4096"/>
           </a:p>
@@ -2453,7 +2549,7 @@
           <a:p>
             <a:fld id="{AF6FA4DE-2D87-4554-B259-F3E07A713AE2}" type="datetimeFigureOut">
               <a:rPr lang="LID4096" smtClean="0"/>
-              <a:t>10/29/2023</a:t>
+              <a:t>10/30/2023</a:t>
             </a:fld>
             <a:endParaRPr lang="LID4096"/>
           </a:p>
@@ -2742,7 +2838,7 @@
           <a:p>
             <a:fld id="{AF6FA4DE-2D87-4554-B259-F3E07A713AE2}" type="datetimeFigureOut">
               <a:rPr lang="LID4096" smtClean="0"/>
-              <a:t>10/29/2023</a:t>
+              <a:t>10/30/2023</a:t>
             </a:fld>
             <a:endParaRPr lang="LID4096"/>
           </a:p>
@@ -2985,7 +3081,7 @@
           <a:p>
             <a:fld id="{AF6FA4DE-2D87-4554-B259-F3E07A713AE2}" type="datetimeFigureOut">
               <a:rPr lang="LID4096" smtClean="0"/>
-              <a:t>10/29/2023</a:t>
+              <a:t>10/30/2023</a:t>
             </a:fld>
             <a:endParaRPr lang="LID4096"/>
           </a:p>
@@ -3687,6 +3783,215 @@
 </p:sld>
 </file>
 
+<file path=ppt/slides/slide4.xml><?xml version="1.0" encoding="utf-8"?>
+<p:sld xmlns:a="http://schemas.openxmlformats.org/drawingml/2006/main" xmlns:r="http://schemas.openxmlformats.org/officeDocument/2006/relationships" xmlns:p="http://schemas.openxmlformats.org/presentationml/2006/main">
+  <p:cSld>
+    <p:spTree>
+      <p:nvGrpSpPr>
+        <p:cNvPr id="1" name=""/>
+        <p:cNvGrpSpPr/>
+        <p:nvPr/>
+      </p:nvGrpSpPr>
+      <p:grpSpPr>
+        <a:xfrm>
+          <a:off x="0" y="0"/>
+          <a:ext cx="0" cy="0"/>
+          <a:chOff x="0" y="0"/>
+          <a:chExt cx="0" cy="0"/>
+        </a:xfrm>
+      </p:grpSpPr>
+      <p:pic>
+        <p:nvPicPr>
+          <p:cNvPr id="5" name="Picture 4">
+            <a:extLst>
+              <a:ext uri="{FF2B5EF4-FFF2-40B4-BE49-F238E27FC236}">
+                <a16:creationId xmlns:a16="http://schemas.microsoft.com/office/drawing/2014/main" id="{75E7A4CE-0DB1-EDD3-B9F0-0475FF9095A1}"/>
+              </a:ext>
+            </a:extLst>
+          </p:cNvPr>
+          <p:cNvPicPr>
+            <a:picLocks noChangeAspect="1"/>
+          </p:cNvPicPr>
+          <p:nvPr/>
+        </p:nvPicPr>
+        <p:blipFill>
+          <a:blip r:embed="rId2"/>
+          <a:stretch>
+            <a:fillRect/>
+          </a:stretch>
+        </p:blipFill>
+        <p:spPr>
+          <a:xfrm>
+            <a:off x="6672466" y="1776473"/>
+            <a:ext cx="4912872" cy="2105517"/>
+          </a:xfrm>
+          <a:prstGeom prst="rect">
+            <a:avLst/>
+          </a:prstGeom>
+        </p:spPr>
+      </p:pic>
+      <p:pic>
+        <p:nvPicPr>
+          <p:cNvPr id="9" name="Picture 8">
+            <a:extLst>
+              <a:ext uri="{FF2B5EF4-FFF2-40B4-BE49-F238E27FC236}">
+                <a16:creationId xmlns:a16="http://schemas.microsoft.com/office/drawing/2014/main" id="{99F11AF4-B8F4-CB50-3ACF-A7E9EC044365}"/>
+              </a:ext>
+            </a:extLst>
+          </p:cNvPr>
+          <p:cNvPicPr>
+            <a:picLocks noChangeAspect="1"/>
+          </p:cNvPicPr>
+          <p:nvPr/>
+        </p:nvPicPr>
+        <p:blipFill>
+          <a:blip r:embed="rId3"/>
+          <a:stretch>
+            <a:fillRect/>
+          </a:stretch>
+        </p:blipFill>
+        <p:spPr>
+          <a:xfrm>
+            <a:off x="400185" y="2705150"/>
+            <a:ext cx="5695815" cy="379721"/>
+          </a:xfrm>
+          <a:prstGeom prst="rect">
+            <a:avLst/>
+          </a:prstGeom>
+        </p:spPr>
+      </p:pic>
+      <p:pic>
+        <p:nvPicPr>
+          <p:cNvPr id="11" name="Picture 10">
+            <a:extLst>
+              <a:ext uri="{FF2B5EF4-FFF2-40B4-BE49-F238E27FC236}">
+                <a16:creationId xmlns:a16="http://schemas.microsoft.com/office/drawing/2014/main" id="{248E8095-D905-2C7B-C55A-7B2384F15C12}"/>
+              </a:ext>
+            </a:extLst>
+          </p:cNvPr>
+          <p:cNvPicPr>
+            <a:picLocks noChangeAspect="1"/>
+          </p:cNvPicPr>
+          <p:nvPr/>
+        </p:nvPicPr>
+        <p:blipFill rotWithShape="1">
+          <a:blip r:embed="rId4"/>
+          <a:srcRect l="2273"/>
+          <a:stretch/>
+        </p:blipFill>
+        <p:spPr>
+          <a:xfrm>
+            <a:off x="400184" y="3049015"/>
+            <a:ext cx="5695815" cy="638929"/>
+          </a:xfrm>
+          <a:prstGeom prst="rect">
+            <a:avLst/>
+          </a:prstGeom>
+        </p:spPr>
+      </p:pic>
+      <p:pic>
+        <p:nvPicPr>
+          <p:cNvPr id="13" name="Picture 12">
+            <a:extLst>
+              <a:ext uri="{FF2B5EF4-FFF2-40B4-BE49-F238E27FC236}">
+                <a16:creationId xmlns:a16="http://schemas.microsoft.com/office/drawing/2014/main" id="{C137E9FB-6F58-D18C-D5A9-680485F15459}"/>
+              </a:ext>
+            </a:extLst>
+          </p:cNvPr>
+          <p:cNvPicPr>
+            <a:picLocks noChangeAspect="1"/>
+          </p:cNvPicPr>
+          <p:nvPr/>
+        </p:nvPicPr>
+        <p:blipFill>
+          <a:blip r:embed="rId5"/>
+          <a:stretch>
+            <a:fillRect/>
+          </a:stretch>
+        </p:blipFill>
+        <p:spPr>
+          <a:xfrm>
+            <a:off x="6375185" y="4924833"/>
+            <a:ext cx="4730821" cy="551734"/>
+          </a:xfrm>
+          <a:prstGeom prst="rect">
+            <a:avLst/>
+          </a:prstGeom>
+        </p:spPr>
+      </p:pic>
+    </p:spTree>
+    <p:extLst>
+      <p:ext uri="{BB962C8B-B14F-4D97-AF65-F5344CB8AC3E}">
+        <p14:creationId xmlns:p14="http://schemas.microsoft.com/office/powerpoint/2010/main" val="4066925894"/>
+      </p:ext>
+    </p:extLst>
+  </p:cSld>
+  <p:clrMapOvr>
+    <a:masterClrMapping/>
+  </p:clrMapOvr>
+</p:sld>
+</file>
+
+<file path=ppt/slides/slide5.xml><?xml version="1.0" encoding="utf-8"?>
+<p:sld xmlns:a="http://schemas.openxmlformats.org/drawingml/2006/main" xmlns:r="http://schemas.openxmlformats.org/officeDocument/2006/relationships" xmlns:p="http://schemas.openxmlformats.org/presentationml/2006/main">
+  <p:cSld>
+    <p:spTree>
+      <p:nvGrpSpPr>
+        <p:cNvPr id="1" name=""/>
+        <p:cNvGrpSpPr/>
+        <p:nvPr/>
+      </p:nvGrpSpPr>
+      <p:grpSpPr>
+        <a:xfrm>
+          <a:off x="0" y="0"/>
+          <a:ext cx="0" cy="0"/>
+          <a:chOff x="0" y="0"/>
+          <a:chExt cx="0" cy="0"/>
+        </a:xfrm>
+      </p:grpSpPr>
+      <p:pic>
+        <p:nvPicPr>
+          <p:cNvPr id="5" name="Picture 4">
+            <a:extLst>
+              <a:ext uri="{FF2B5EF4-FFF2-40B4-BE49-F238E27FC236}">
+                <a16:creationId xmlns:a16="http://schemas.microsoft.com/office/drawing/2014/main" id="{554E9CF6-D405-E9B3-5148-D711ADEED6CA}"/>
+              </a:ext>
+            </a:extLst>
+          </p:cNvPr>
+          <p:cNvPicPr>
+            <a:picLocks noChangeAspect="1"/>
+          </p:cNvPicPr>
+          <p:nvPr/>
+        </p:nvPicPr>
+        <p:blipFill>
+          <a:blip r:embed="rId2"/>
+          <a:stretch>
+            <a:fillRect/>
+          </a:stretch>
+        </p:blipFill>
+        <p:spPr>
+          <a:xfrm>
+            <a:off x="0" y="1501609"/>
+            <a:ext cx="12192000" cy="3251668"/>
+          </a:xfrm>
+          <a:prstGeom prst="rect">
+            <a:avLst/>
+          </a:prstGeom>
+        </p:spPr>
+      </p:pic>
+    </p:spTree>
+    <p:extLst>
+      <p:ext uri="{BB962C8B-B14F-4D97-AF65-F5344CB8AC3E}">
+        <p14:creationId xmlns:p14="http://schemas.microsoft.com/office/powerpoint/2010/main" val="1368449490"/>
+      </p:ext>
+    </p:extLst>
+  </p:cSld>
+  <p:clrMapOvr>
+    <a:masterClrMapping/>
+  </p:clrMapOvr>
+</p:sld>
+</file>
+
 <file path=ppt/theme/theme1.xml><?xml version="1.0" encoding="utf-8"?>
 <a:theme xmlns:a="http://schemas.openxmlformats.org/drawingml/2006/main" name="Office Theme">
   <a:themeElements>

</xml_diff>